<commit_message>
updated model section of ppt
</commit_message>
<xml_diff>
--- a/Presentation.pptx
+++ b/Presentation.pptx
@@ -2669,11 +2669,11 @@
   <dgm:cxnLst>
     <dgm:cxn modelId="{600B2017-CEC5-4080-A1E9-1C105AC23986}" type="presOf" srcId="{B1669BFF-F9EB-450E-B7A0-1FC2031F6E66}" destId="{AA92F248-552E-4807-B757-8152E31C9DBE}" srcOrd="0" destOrd="0" presId="urn:microsoft.com/office/officeart/2016/7/layout/LinearBlockProcessNumbered"/>
     <dgm:cxn modelId="{B74C5E26-AECA-493A-8C41-90AC504094E8}" type="presOf" srcId="{97710601-3675-4AAF-802A-525A87F21D5B}" destId="{AB823D1B-C8FE-4645-B53A-71BBAC9C4172}" srcOrd="0" destOrd="0" presId="urn:microsoft.com/office/officeart/2016/7/layout/LinearBlockProcessNumbered"/>
-    <dgm:cxn modelId="{A0AD9E51-EC42-4FEA-8A4D-33BDD1E90548}" srcId="{A56AC842-FCF8-4AAD-AFBD-0864B5F5BD03}" destId="{0925071E-9D8A-41E0-9E73-3D9D76985B33}" srcOrd="2" destOrd="0" parTransId="{FC277175-ABC6-483B-9F11-B9BD1C056DC1}" sibTransId="{5443F6D4-29FC-45B0-9E4D-21A933266124}"/>
-    <dgm:cxn modelId="{63F10258-4888-4553-B1F4-30DA234D142D}" type="presOf" srcId="{0925071E-9D8A-41E0-9E73-3D9D76985B33}" destId="{151B9AD0-E9BB-4111-A446-42E4D23F7890}" srcOrd="1" destOrd="0" presId="urn:microsoft.com/office/officeart/2016/7/layout/LinearBlockProcessNumbered"/>
     <dgm:cxn modelId="{1BA8135D-4BC6-4A71-831E-03F906B99180}" type="presOf" srcId="{B9264F9C-D18D-472D-BCE9-B5E544012C82}" destId="{0B502D18-F143-44A8-A56B-6D09E68EB019}" srcOrd="0" destOrd="0" presId="urn:microsoft.com/office/officeart/2016/7/layout/LinearBlockProcessNumbered"/>
     <dgm:cxn modelId="{C50B9364-DF78-4381-8462-C3C7C73D6365}" type="presOf" srcId="{EEF430E7-D8B6-41B9-A5FD-223A08391C0F}" destId="{A25B8F25-3E76-47EE-B28B-34BCEC81E445}" srcOrd="1" destOrd="0" presId="urn:microsoft.com/office/officeart/2016/7/layout/LinearBlockProcessNumbered"/>
+    <dgm:cxn modelId="{A0AD9E51-EC42-4FEA-8A4D-33BDD1E90548}" srcId="{A56AC842-FCF8-4AAD-AFBD-0864B5F5BD03}" destId="{0925071E-9D8A-41E0-9E73-3D9D76985B33}" srcOrd="2" destOrd="0" parTransId="{FC277175-ABC6-483B-9F11-B9BD1C056DC1}" sibTransId="{5443F6D4-29FC-45B0-9E4D-21A933266124}"/>
     <dgm:cxn modelId="{9F26A777-FF18-41E5-A931-009F0D6860FD}" type="presOf" srcId="{08D30E40-1961-40F7-A89E-9AB8F8A8E51F}" destId="{736FC8D0-F787-4ADD-BE56-A284428764C5}" srcOrd="0" destOrd="0" presId="urn:microsoft.com/office/officeart/2016/7/layout/LinearBlockProcessNumbered"/>
+    <dgm:cxn modelId="{63F10258-4888-4553-B1F4-30DA234D142D}" type="presOf" srcId="{0925071E-9D8A-41E0-9E73-3D9D76985B33}" destId="{151B9AD0-E9BB-4111-A446-42E4D23F7890}" srcOrd="1" destOrd="0" presId="urn:microsoft.com/office/officeart/2016/7/layout/LinearBlockProcessNumbered"/>
     <dgm:cxn modelId="{B6FD337E-6991-4BEC-BA2A-41A0E2EFEE27}" type="presOf" srcId="{0925071E-9D8A-41E0-9E73-3D9D76985B33}" destId="{50122972-40B8-49CE-9992-A9C55E14F608}" srcOrd="0" destOrd="0" presId="urn:microsoft.com/office/officeart/2016/7/layout/LinearBlockProcessNumbered"/>
     <dgm:cxn modelId="{D2AFFB86-5407-4B8B-B5A7-A1EC0F5A7900}" srcId="{A56AC842-FCF8-4AAD-AFBD-0864B5F5BD03}" destId="{EEF430E7-D8B6-41B9-A5FD-223A08391C0F}" srcOrd="3" destOrd="0" parTransId="{03C84A5A-BB59-4AB2-9588-E2FD0432C4D2}" sibTransId="{B9264F9C-D18D-472D-BCE9-B5E544012C82}"/>
     <dgm:cxn modelId="{B0A9C3AA-401B-4D15-9D8A-D1128B906444}" type="presOf" srcId="{A56AC842-FCF8-4AAD-AFBD-0864B5F5BD03}" destId="{8B0DF416-0D4C-4F24-88D7-A6FD9536E081}" srcOrd="0" destOrd="0" presId="urn:microsoft.com/office/officeart/2016/7/layout/LinearBlockProcessNumbered"/>
@@ -2718,7 +2718,7 @@
 <dgm:dataModel xmlns:dgm="http://schemas.openxmlformats.org/drawingml/2006/diagram" xmlns:a="http://schemas.openxmlformats.org/drawingml/2006/main">
   <dgm:ptLst>
     <dgm:pt modelId="{DFDCE516-0D67-46FB-9FC9-1B0B98577A16}" type="doc">
-      <dgm:prSet loTypeId="urn:microsoft.com/office/officeart/2005/8/layout/vList2" loCatId="list" qsTypeId="urn:microsoft.com/office/officeart/2005/8/quickstyle/simple1" qsCatId="simple" csTypeId="urn:microsoft.com/office/officeart/2005/8/colors/accent1_2" csCatId="accent1"/>
+      <dgm:prSet loTypeId="urn:microsoft.com/office/officeart/2005/8/layout/vList2" loCatId="list" qsTypeId="urn:microsoft.com/office/officeart/2005/8/quickstyle/simple1" qsCatId="simple" csTypeId="urn:microsoft.com/office/officeart/2005/8/colors/accent1_2" csCatId="accent1" phldr="1"/>
       <dgm:spPr/>
       <dgm:t>
         <a:bodyPr/>
@@ -2736,7 +2736,7 @@
         <a:lstStyle/>
         <a:p>
           <a:r>
-            <a:rPr lang="en-US"/>
+            <a:rPr lang="en-US" dirty="0"/>
             <a:t>Use the Flickr API to create dataset of birds</a:t>
           </a:r>
         </a:p>
@@ -2808,7 +2808,7 @@
         <a:lstStyle/>
         <a:p>
           <a:r>
-            <a:rPr lang="en-US"/>
+            <a:rPr lang="en-US" dirty="0"/>
             <a:t>Define Size and Location for Photos to Download to </a:t>
           </a:r>
         </a:p>
@@ -2844,8 +2844,8 @@
         <a:lstStyle/>
         <a:p>
           <a:r>
-            <a:rPr lang="en-US"/>
-            <a:t>Clean dataset to remove nonrelevant photos and photos were birds are too small to be easily identified </a:t>
+            <a:rPr lang="en-US" dirty="0"/>
+            <a:t>Clean dataset to remove nonrelevant photos and photos where birds are too small to be easily identified </a:t>
           </a:r>
         </a:p>
       </dgm:t>
@@ -2986,8 +2986,8 @@
     <dgm:cxn modelId="{6E7A1632-C20C-48EE-9991-36906984C52D}" srcId="{DFDCE516-0D67-46FB-9FC9-1B0B98577A16}" destId="{11046346-6B08-4F1F-BA62-5A8428841CB5}" srcOrd="4" destOrd="0" parTransId="{D7850430-2D56-4F6F-9C65-BAF816C2CADD}" sibTransId="{9ACCA623-C9E8-442B-94C9-B8959C6FC608}"/>
     <dgm:cxn modelId="{56BF3237-4698-49EB-83B2-B916917DFF2E}" type="presOf" srcId="{11046346-6B08-4F1F-BA62-5A8428841CB5}" destId="{3643DC03-1888-4136-B8E8-9FF5B551E7D5}" srcOrd="0" destOrd="0" presId="urn:microsoft.com/office/officeart/2005/8/layout/vList2"/>
     <dgm:cxn modelId="{F1DAEF3B-4C38-430D-B72A-DE87030BD165}" type="presOf" srcId="{F2FE7298-9498-4478-9B5F-2ADD65462249}" destId="{589CBBAF-BA02-45B6-8840-4A60A41FB7F3}" srcOrd="0" destOrd="0" presId="urn:microsoft.com/office/officeart/2005/8/layout/vList2"/>
+    <dgm:cxn modelId="{62620B5E-0692-4F40-9943-DE1C3D841EA5}" type="presOf" srcId="{DFDCE516-0D67-46FB-9FC9-1B0B98577A16}" destId="{7C481EFA-9E78-4ED4-ACE6-F788D0BED9DD}" srcOrd="0" destOrd="0" presId="urn:microsoft.com/office/officeart/2005/8/layout/vList2"/>
     <dgm:cxn modelId="{5C940549-CCC9-4F28-AFB9-FD546959EFCC}" type="presOf" srcId="{86B771E7-BD2B-4019-B713-98D4174E3FE1}" destId="{7AF75A0C-B364-42C1-855F-DF867D2F788A}" srcOrd="0" destOrd="0" presId="urn:microsoft.com/office/officeart/2005/8/layout/vList2"/>
-    <dgm:cxn modelId="{62620B5E-0692-4F40-9943-DE1C3D841EA5}" type="presOf" srcId="{DFDCE516-0D67-46FB-9FC9-1B0B98577A16}" destId="{7C481EFA-9E78-4ED4-ACE6-F788D0BED9DD}" srcOrd="0" destOrd="0" presId="urn:microsoft.com/office/officeart/2005/8/layout/vList2"/>
     <dgm:cxn modelId="{ABDE546E-07D1-42C9-94CD-EA8DA0FC386D}" type="presOf" srcId="{D874529F-E315-4EBF-A083-1F0DDD1E89FB}" destId="{7F076CA7-74B8-49A1-9FAF-E8493F38A891}" srcOrd="0" destOrd="0" presId="urn:microsoft.com/office/officeart/2005/8/layout/vList2"/>
     <dgm:cxn modelId="{2B51C7A1-C383-4BF0-B9E0-07E8D5834C54}" srcId="{DFDCE516-0D67-46FB-9FC9-1B0B98577A16}" destId="{F2FE7298-9498-4478-9B5F-2ADD65462249}" srcOrd="2" destOrd="0" parTransId="{F12BFA39-B3D5-40F5-A673-900652AA422A}" sibTransId="{1A20F32E-4DE2-4BA6-B9E0-74365A218EAC}"/>
     <dgm:cxn modelId="{3742C5EF-71EE-46E1-B75D-7F63F7AA5C0A}" srcId="{DFDCE516-0D67-46FB-9FC9-1B0B98577A16}" destId="{D874529F-E315-4EBF-A083-1F0DDD1E89FB}" srcOrd="1" destOrd="0" parTransId="{5CE3B5B8-E49A-4DCA-8E78-03936168A4D7}" sibTransId="{7E5AB090-7B8C-425E-B501-5C9BE6A16561}"/>
@@ -3026,15 +3026,23 @@
       </dgm:t>
     </dgm:pt>
     <dgm:pt modelId="{86B771E7-BD2B-4019-B713-98D4174E3FE1}">
-      <dgm:prSet/>
+      <dgm:prSet custT="1"/>
       <dgm:spPr/>
       <dgm:t>
         <a:bodyPr/>
         <a:lstStyle/>
         <a:p>
           <a:r>
-            <a:rPr lang="en-US" dirty="0"/>
-            <a:t>Mounted Google Drive to Google Collab for Model </a:t>
+            <a:rPr lang="en-US" sz="1700" dirty="0"/>
+            <a:t>Mounted Google Drive to Google </a:t>
+          </a:r>
+          <a:r>
+            <a:rPr lang="en-US" sz="1700" dirty="0" err="1"/>
+            <a:t>Colab</a:t>
+          </a:r>
+          <a:r>
+            <a:rPr lang="en-US" sz="1700" dirty="0"/>
+            <a:t> for Model </a:t>
           </a:r>
         </a:p>
       </dgm:t>
@@ -3046,7 +3054,7 @@
         <a:bodyPr/>
         <a:lstStyle/>
         <a:p>
-          <a:endParaRPr lang="en-US"/>
+          <a:endParaRPr lang="en-US" sz="1700"/>
         </a:p>
       </dgm:t>
     </dgm:pt>
@@ -3057,20 +3065,20 @@
         <a:bodyPr/>
         <a:lstStyle/>
         <a:p>
-          <a:endParaRPr lang="en-US"/>
+          <a:endParaRPr lang="en-US" sz="1700"/>
         </a:p>
       </dgm:t>
     </dgm:pt>
     <dgm:pt modelId="{FEBAB7B0-7B28-4A7D-AB77-FBA38D29C31A}">
-      <dgm:prSet/>
+      <dgm:prSet custT="1"/>
       <dgm:spPr/>
       <dgm:t>
         <a:bodyPr/>
         <a:lstStyle/>
         <a:p>
           <a:r>
-            <a:rPr lang="en-US" dirty="0"/>
-            <a:t>X1 </a:t>
+            <a:rPr lang="en-US" sz="1700" dirty="0"/>
+            <a:t>Created Sequential Model with 10 Layers </a:t>
           </a:r>
         </a:p>
       </dgm:t>
@@ -3082,7 +3090,7 @@
         <a:bodyPr/>
         <a:lstStyle/>
         <a:p>
-          <a:endParaRPr lang="en-US"/>
+          <a:endParaRPr lang="en-US" sz="1700"/>
         </a:p>
       </dgm:t>
     </dgm:pt>
@@ -3093,20 +3101,20 @@
         <a:bodyPr/>
         <a:lstStyle/>
         <a:p>
-          <a:endParaRPr lang="en-US"/>
+          <a:endParaRPr lang="en-US" sz="1700"/>
         </a:p>
       </dgm:t>
     </dgm:pt>
     <dgm:pt modelId="{6B00E1B2-18E2-4A41-9118-F1673FFCE6AB}">
-      <dgm:prSet/>
+      <dgm:prSet custT="1"/>
       <dgm:spPr/>
       <dgm:t>
         <a:bodyPr/>
         <a:lstStyle/>
         <a:p>
           <a:r>
-            <a:rPr lang="en-US" dirty="0"/>
-            <a:t>X2</a:t>
+            <a:rPr lang="en-US" sz="1700" dirty="0"/>
+            <a:t>Used Rescaling Layer to Standardize RGB Channel Values</a:t>
           </a:r>
         </a:p>
       </dgm:t>
@@ -3118,7 +3126,7 @@
         <a:bodyPr/>
         <a:lstStyle/>
         <a:p>
-          <a:endParaRPr lang="en-US"/>
+          <a:endParaRPr lang="en-US" sz="1700"/>
         </a:p>
       </dgm:t>
     </dgm:pt>
@@ -3129,20 +3137,28 @@
         <a:bodyPr/>
         <a:lstStyle/>
         <a:p>
-          <a:endParaRPr lang="en-US"/>
+          <a:endParaRPr lang="en-US" sz="1700"/>
         </a:p>
       </dgm:t>
     </dgm:pt>
     <dgm:pt modelId="{5E1CCF4A-0DFA-4391-9EDF-9622B23230C4}">
-      <dgm:prSet/>
+      <dgm:prSet custT="1"/>
       <dgm:spPr/>
       <dgm:t>
         <a:bodyPr/>
         <a:lstStyle/>
         <a:p>
           <a:r>
-            <a:rPr lang="en-US" dirty="0"/>
-            <a:t>X3</a:t>
+            <a:rPr lang="en-US" sz="1700" dirty="0"/>
+            <a:t>Performed Feature Analysis with Conv2D and </a:t>
+          </a:r>
+          <a:r>
+            <a:rPr lang="en-US" sz="1700" dirty="0" err="1"/>
+            <a:t>MaxPooling</a:t>
+          </a:r>
+          <a:r>
+            <a:rPr lang="en-US" sz="1700" dirty="0"/>
+            <a:t> Layers</a:t>
           </a:r>
         </a:p>
       </dgm:t>
@@ -3154,7 +3170,7 @@
         <a:bodyPr/>
         <a:lstStyle/>
         <a:p>
-          <a:endParaRPr lang="en-US"/>
+          <a:endParaRPr lang="en-US" sz="1700"/>
         </a:p>
       </dgm:t>
     </dgm:pt>
@@ -3165,20 +3181,20 @@
         <a:bodyPr/>
         <a:lstStyle/>
         <a:p>
-          <a:endParaRPr lang="en-US"/>
+          <a:endParaRPr lang="en-US" sz="1700"/>
         </a:p>
       </dgm:t>
     </dgm:pt>
     <dgm:pt modelId="{C1B1A2C0-68AE-4534-843D-4A5D57B43204}">
-      <dgm:prSet/>
+      <dgm:prSet custT="1"/>
       <dgm:spPr/>
       <dgm:t>
         <a:bodyPr/>
         <a:lstStyle/>
         <a:p>
           <a:r>
-            <a:rPr lang="en-US" dirty="0"/>
-            <a:t>X4</a:t>
+            <a:rPr lang="en-US" sz="1700" dirty="0"/>
+            <a:t>Flattened into 1D and Ran Through Dense Layer</a:t>
           </a:r>
         </a:p>
       </dgm:t>
@@ -3190,7 +3206,7 @@
         <a:bodyPr/>
         <a:lstStyle/>
         <a:p>
-          <a:endParaRPr lang="en-US"/>
+          <a:endParaRPr lang="en-US" sz="1700"/>
         </a:p>
       </dgm:t>
     </dgm:pt>
@@ -3201,20 +3217,20 @@
         <a:bodyPr/>
         <a:lstStyle/>
         <a:p>
-          <a:endParaRPr lang="en-US"/>
+          <a:endParaRPr lang="en-US" sz="1700"/>
         </a:p>
       </dgm:t>
     </dgm:pt>
     <dgm:pt modelId="{8A07B19B-4B37-4817-A93F-7937C1CE11D7}">
-      <dgm:prSet/>
+      <dgm:prSet custT="1"/>
       <dgm:spPr/>
       <dgm:t>
         <a:bodyPr/>
         <a:lstStyle/>
         <a:p>
           <a:r>
-            <a:rPr lang="en-US" dirty="0"/>
-            <a:t>X5</a:t>
+            <a:rPr lang="en-US" sz="1700" dirty="0"/>
+            <a:t>Created Output with Bird Probabilities</a:t>
           </a:r>
         </a:p>
       </dgm:t>
@@ -3226,7 +3242,7 @@
         <a:bodyPr/>
         <a:lstStyle/>
         <a:p>
-          <a:endParaRPr lang="en-US"/>
+          <a:endParaRPr lang="en-US" sz="1700"/>
         </a:p>
       </dgm:t>
     </dgm:pt>
@@ -3237,7 +3253,7 @@
         <a:bodyPr/>
         <a:lstStyle/>
         <a:p>
-          <a:endParaRPr lang="en-US"/>
+          <a:endParaRPr lang="en-US" sz="1700"/>
         </a:p>
       </dgm:t>
     </dgm:pt>
@@ -3277,7 +3293,7 @@
       <dgm:spPr/>
     </dgm:pt>
     <dgm:pt modelId="{3B97045A-172A-4057-8CCB-76895BA1FDE6}" type="pres">
-      <dgm:prSet presAssocID="{6B00E1B2-18E2-4A41-9118-F1673FFCE6AB}" presName="parentText" presStyleLbl="node1" presStyleIdx="2" presStyleCnt="6">
+      <dgm:prSet presAssocID="{6B00E1B2-18E2-4A41-9118-F1673FFCE6AB}" presName="parentText" presStyleLbl="node1" presStyleIdx="2" presStyleCnt="6" custLinFactNeighborX="-282">
         <dgm:presLayoutVars>
           <dgm:chMax val="0"/>
           <dgm:bulletEnabled val="1"/>
@@ -3329,11 +3345,11 @@
     <dgm:cxn modelId="{6CD58C01-0C76-4F74-9BE8-D0E1221455AA}" srcId="{DFDCE516-0D67-46FB-9FC9-1B0B98577A16}" destId="{86B771E7-BD2B-4019-B713-98D4174E3FE1}" srcOrd="0" destOrd="0" parTransId="{9E30E029-823A-40B3-937C-F0389C34FD39}" sibTransId="{1AA4C1B2-4D56-4219-8E35-CD6DAD937CBE}"/>
     <dgm:cxn modelId="{A0274505-7AD0-4FBA-8B36-F26A0269F4CF}" type="presOf" srcId="{5E1CCF4A-0DFA-4391-9EDF-9622B23230C4}" destId="{21D968B3-3413-4124-821D-F0D8A3C8CFF5}" srcOrd="0" destOrd="0" presId="urn:microsoft.com/office/officeart/2005/8/layout/vList2"/>
     <dgm:cxn modelId="{E459D32B-BDD6-4A39-B98B-3FBA6A6D8A2E}" srcId="{DFDCE516-0D67-46FB-9FC9-1B0B98577A16}" destId="{FEBAB7B0-7B28-4A7D-AB77-FBA38D29C31A}" srcOrd="1" destOrd="0" parTransId="{217534B1-DAE9-43C1-8564-4531E20725E6}" sibTransId="{27216AAD-BBB7-4E83-89FD-7A4C44DF7390}"/>
+    <dgm:cxn modelId="{62620B5E-0692-4F40-9943-DE1C3D841EA5}" type="presOf" srcId="{DFDCE516-0D67-46FB-9FC9-1B0B98577A16}" destId="{7C481EFA-9E78-4ED4-ACE6-F788D0BED9DD}" srcOrd="0" destOrd="0" presId="urn:microsoft.com/office/officeart/2005/8/layout/vList2"/>
     <dgm:cxn modelId="{70387542-75CF-454C-ADBF-A1DD578AC5EA}" type="presOf" srcId="{6B00E1B2-18E2-4A41-9118-F1673FFCE6AB}" destId="{3B97045A-172A-4057-8CCB-76895BA1FDE6}" srcOrd="0" destOrd="0" presId="urn:microsoft.com/office/officeart/2005/8/layout/vList2"/>
     <dgm:cxn modelId="{5C940549-CCC9-4F28-AFB9-FD546959EFCC}" type="presOf" srcId="{86B771E7-BD2B-4019-B713-98D4174E3FE1}" destId="{7AF75A0C-B364-42C1-855F-DF867D2F788A}" srcOrd="0" destOrd="0" presId="urn:microsoft.com/office/officeart/2005/8/layout/vList2"/>
     <dgm:cxn modelId="{3F9F934E-65CD-4EA6-8577-28FFBD23D829}" srcId="{DFDCE516-0D67-46FB-9FC9-1B0B98577A16}" destId="{8A07B19B-4B37-4817-A93F-7937C1CE11D7}" srcOrd="5" destOrd="0" parTransId="{5E649016-799E-45B0-9717-5FF3949A52DA}" sibTransId="{59C2F639-6861-47F4-903A-CFA9DFFA9D6A}"/>
     <dgm:cxn modelId="{2BECB053-61DD-4A10-8654-D9AA9295D451}" type="presOf" srcId="{C1B1A2C0-68AE-4534-843D-4A5D57B43204}" destId="{A9FED693-A99D-4A6A-A0F0-13DB2854A162}" srcOrd="0" destOrd="0" presId="urn:microsoft.com/office/officeart/2005/8/layout/vList2"/>
-    <dgm:cxn modelId="{62620B5E-0692-4F40-9943-DE1C3D841EA5}" type="presOf" srcId="{DFDCE516-0D67-46FB-9FC9-1B0B98577A16}" destId="{7C481EFA-9E78-4ED4-ACE6-F788D0BED9DD}" srcOrd="0" destOrd="0" presId="urn:microsoft.com/office/officeart/2005/8/layout/vList2"/>
     <dgm:cxn modelId="{4757707B-D3A3-4E83-B51E-DCAFA0EA1E73}" srcId="{DFDCE516-0D67-46FB-9FC9-1B0B98577A16}" destId="{6B00E1B2-18E2-4A41-9118-F1673FFCE6AB}" srcOrd="2" destOrd="0" parTransId="{050E9854-FB6E-4E17-A9A0-AD5E96A4EA2D}" sibTransId="{6074E7B1-F1C3-4390-81E3-0BA8673DE715}"/>
     <dgm:cxn modelId="{9ACE13A2-BAD0-4E51-869B-BB7DF253CCB8}" srcId="{DFDCE516-0D67-46FB-9FC9-1B0B98577A16}" destId="{5E1CCF4A-0DFA-4391-9EDF-9622B23230C4}" srcOrd="3" destOrd="0" parTransId="{31332738-1E87-4F13-9830-9B10803E2AC5}" sibTransId="{3C6AFF42-E4FD-407B-8383-8B2E282F51B0}"/>
     <dgm:cxn modelId="{A0C1C6D9-A324-4B66-98C1-A14803DD6E7A}" type="presOf" srcId="{8A07B19B-4B37-4817-A93F-7937C1CE11D7}" destId="{02D43881-500F-4308-B993-48DDC6B63F90}" srcOrd="0" destOrd="0" presId="urn:microsoft.com/office/officeart/2005/8/layout/vList2"/>
@@ -4012,7 +4028,7 @@
             <a:buNone/>
           </a:pPr>
           <a:r>
-            <a:rPr lang="en-US" sz="1700" kern="1200"/>
+            <a:rPr lang="en-US" sz="1700" kern="1200" dirty="0"/>
             <a:t>Use the Flickr API to create dataset of birds</a:t>
           </a:r>
         </a:p>
@@ -4166,7 +4182,7 @@
             <a:buNone/>
           </a:pPr>
           <a:r>
-            <a:rPr lang="en-US" sz="1700" kern="1200"/>
+            <a:rPr lang="en-US" sz="1700" kern="1200" dirty="0"/>
             <a:t>Define Size and Location for Photos to Download to </a:t>
           </a:r>
         </a:p>
@@ -4243,8 +4259,8 @@
             <a:buNone/>
           </a:pPr>
           <a:r>
-            <a:rPr lang="en-US" sz="1700" kern="1200"/>
-            <a:t>Clean dataset to remove nonrelevant photos and photos were birds are too small to be easily identified </a:t>
+            <a:rPr lang="en-US" sz="1700" kern="1200" dirty="0"/>
+            <a:t>Clean dataset to remove nonrelevant photos and photos where birds are too small to be easily identified </a:t>
           </a:r>
         </a:p>
       </dsp:txBody>
@@ -4349,8 +4365,8 @@
       </dsp:nvSpPr>
       <dsp:spPr>
         <a:xfrm>
-          <a:off x="0" y="68245"/>
-          <a:ext cx="8915400" cy="551655"/>
+          <a:off x="0" y="51371"/>
+          <a:ext cx="8915400" cy="542880"/>
         </a:xfrm>
         <a:prstGeom prst="roundRect">
           <a:avLst/>
@@ -4391,12 +4407,12 @@
         </a:fontRef>
       </dsp:style>
       <dsp:txBody>
-        <a:bodyPr spcFirstLastPara="0" vert="horz" wrap="square" lIns="87630" tIns="87630" rIns="87630" bIns="87630" numCol="1" spcCol="1270" anchor="ctr" anchorCtr="0">
+        <a:bodyPr spcFirstLastPara="0" vert="horz" wrap="square" lIns="64770" tIns="64770" rIns="64770" bIns="64770" numCol="1" spcCol="1270" anchor="ctr" anchorCtr="0">
           <a:noAutofit/>
         </a:bodyPr>
         <a:lstStyle/>
         <a:p>
-          <a:pPr marL="0" lvl="0" indent="0" algn="l" defTabSz="1022350">
+          <a:pPr marL="0" lvl="0" indent="0" algn="l" defTabSz="755650">
             <a:lnSpc>
               <a:spcPct val="90000"/>
             </a:lnSpc>
@@ -4409,14 +4425,22 @@
             <a:buNone/>
           </a:pPr>
           <a:r>
-            <a:rPr lang="en-US" sz="2300" kern="1200" dirty="0"/>
-            <a:t>Mounted Google Drive to Google Collab for Model </a:t>
+            <a:rPr lang="en-US" sz="1700" kern="1200" dirty="0"/>
+            <a:t>Mounted Google Drive to Google </a:t>
+          </a:r>
+          <a:r>
+            <a:rPr lang="en-US" sz="1700" kern="1200" dirty="0" err="1"/>
+            <a:t>Colab</a:t>
+          </a:r>
+          <a:r>
+            <a:rPr lang="en-US" sz="1700" kern="1200" dirty="0"/>
+            <a:t> for Model </a:t>
           </a:r>
         </a:p>
       </dsp:txBody>
       <dsp:txXfrm>
-        <a:off x="26930" y="95175"/>
-        <a:ext cx="8861540" cy="497795"/>
+        <a:off x="26501" y="77872"/>
+        <a:ext cx="8862398" cy="489878"/>
       </dsp:txXfrm>
     </dsp:sp>
     <dsp:sp modelId="{2C3033D6-366E-408B-A9EC-05437C6AAABC}">
@@ -4426,8 +4450,8 @@
       </dsp:nvSpPr>
       <dsp:spPr>
         <a:xfrm>
-          <a:off x="0" y="686140"/>
-          <a:ext cx="8915400" cy="551655"/>
+          <a:off x="0" y="677771"/>
+          <a:ext cx="8915400" cy="542880"/>
         </a:xfrm>
         <a:prstGeom prst="roundRect">
           <a:avLst/>
@@ -4468,12 +4492,12 @@
         </a:fontRef>
       </dsp:style>
       <dsp:txBody>
-        <a:bodyPr spcFirstLastPara="0" vert="horz" wrap="square" lIns="87630" tIns="87630" rIns="87630" bIns="87630" numCol="1" spcCol="1270" anchor="ctr" anchorCtr="0">
+        <a:bodyPr spcFirstLastPara="0" vert="horz" wrap="square" lIns="64770" tIns="64770" rIns="64770" bIns="64770" numCol="1" spcCol="1270" anchor="ctr" anchorCtr="0">
           <a:noAutofit/>
         </a:bodyPr>
         <a:lstStyle/>
         <a:p>
-          <a:pPr marL="0" lvl="0" indent="0" algn="l" defTabSz="1022350">
+          <a:pPr marL="0" lvl="0" indent="0" algn="l" defTabSz="755650">
             <a:lnSpc>
               <a:spcPct val="90000"/>
             </a:lnSpc>
@@ -4486,14 +4510,14 @@
             <a:buNone/>
           </a:pPr>
           <a:r>
-            <a:rPr lang="en-US" sz="2300" kern="1200" dirty="0"/>
-            <a:t>X1 </a:t>
+            <a:rPr lang="en-US" sz="1700" kern="1200" dirty="0"/>
+            <a:t>Created Sequential Model with 10 Layers </a:t>
           </a:r>
         </a:p>
       </dsp:txBody>
       <dsp:txXfrm>
-        <a:off x="26930" y="713070"/>
-        <a:ext cx="8861540" cy="497795"/>
+        <a:off x="26501" y="704272"/>
+        <a:ext cx="8862398" cy="489878"/>
       </dsp:txXfrm>
     </dsp:sp>
     <dsp:sp modelId="{3B97045A-172A-4057-8CCB-76895BA1FDE6}">
@@ -4503,8 +4527,8 @@
       </dsp:nvSpPr>
       <dsp:spPr>
         <a:xfrm>
-          <a:off x="0" y="1304035"/>
-          <a:ext cx="8915400" cy="551655"/>
+          <a:off x="0" y="1304171"/>
+          <a:ext cx="8915400" cy="542880"/>
         </a:xfrm>
         <a:prstGeom prst="roundRect">
           <a:avLst/>
@@ -4545,12 +4569,12 @@
         </a:fontRef>
       </dsp:style>
       <dsp:txBody>
-        <a:bodyPr spcFirstLastPara="0" vert="horz" wrap="square" lIns="87630" tIns="87630" rIns="87630" bIns="87630" numCol="1" spcCol="1270" anchor="ctr" anchorCtr="0">
+        <a:bodyPr spcFirstLastPara="0" vert="horz" wrap="square" lIns="64770" tIns="64770" rIns="64770" bIns="64770" numCol="1" spcCol="1270" anchor="ctr" anchorCtr="0">
           <a:noAutofit/>
         </a:bodyPr>
         <a:lstStyle/>
         <a:p>
-          <a:pPr marL="0" lvl="0" indent="0" algn="l" defTabSz="1022350">
+          <a:pPr marL="0" lvl="0" indent="0" algn="l" defTabSz="755650">
             <a:lnSpc>
               <a:spcPct val="90000"/>
             </a:lnSpc>
@@ -4563,14 +4587,14 @@
             <a:buNone/>
           </a:pPr>
           <a:r>
-            <a:rPr lang="en-US" sz="2300" kern="1200" dirty="0"/>
-            <a:t>X2</a:t>
+            <a:rPr lang="en-US" sz="1700" kern="1200" dirty="0"/>
+            <a:t>Used Rescaling Layer to Standardize RGB Channel Values</a:t>
           </a:r>
         </a:p>
       </dsp:txBody>
       <dsp:txXfrm>
-        <a:off x="26930" y="1330965"/>
-        <a:ext cx="8861540" cy="497795"/>
+        <a:off x="26501" y="1330672"/>
+        <a:ext cx="8862398" cy="489878"/>
       </dsp:txXfrm>
     </dsp:sp>
     <dsp:sp modelId="{21D968B3-3413-4124-821D-F0D8A3C8CFF5}">
@@ -4580,8 +4604,8 @@
       </dsp:nvSpPr>
       <dsp:spPr>
         <a:xfrm>
-          <a:off x="0" y="1921931"/>
-          <a:ext cx="8915400" cy="551655"/>
+          <a:off x="0" y="1930571"/>
+          <a:ext cx="8915400" cy="542880"/>
         </a:xfrm>
         <a:prstGeom prst="roundRect">
           <a:avLst/>
@@ -4622,12 +4646,12 @@
         </a:fontRef>
       </dsp:style>
       <dsp:txBody>
-        <a:bodyPr spcFirstLastPara="0" vert="horz" wrap="square" lIns="87630" tIns="87630" rIns="87630" bIns="87630" numCol="1" spcCol="1270" anchor="ctr" anchorCtr="0">
+        <a:bodyPr spcFirstLastPara="0" vert="horz" wrap="square" lIns="64770" tIns="64770" rIns="64770" bIns="64770" numCol="1" spcCol="1270" anchor="ctr" anchorCtr="0">
           <a:noAutofit/>
         </a:bodyPr>
         <a:lstStyle/>
         <a:p>
-          <a:pPr marL="0" lvl="0" indent="0" algn="l" defTabSz="1022350">
+          <a:pPr marL="0" lvl="0" indent="0" algn="l" defTabSz="755650">
             <a:lnSpc>
               <a:spcPct val="90000"/>
             </a:lnSpc>
@@ -4640,14 +4664,22 @@
             <a:buNone/>
           </a:pPr>
           <a:r>
-            <a:rPr lang="en-US" sz="2300" kern="1200" dirty="0"/>
-            <a:t>X3</a:t>
+            <a:rPr lang="en-US" sz="1700" kern="1200" dirty="0"/>
+            <a:t>Performed Feature Analysis with Conv2D and </a:t>
+          </a:r>
+          <a:r>
+            <a:rPr lang="en-US" sz="1700" kern="1200" dirty="0" err="1"/>
+            <a:t>MaxPooling</a:t>
+          </a:r>
+          <a:r>
+            <a:rPr lang="en-US" sz="1700" kern="1200" dirty="0"/>
+            <a:t> Layers</a:t>
           </a:r>
         </a:p>
       </dsp:txBody>
       <dsp:txXfrm>
-        <a:off x="26930" y="1948861"/>
-        <a:ext cx="8861540" cy="497795"/>
+        <a:off x="26501" y="1957072"/>
+        <a:ext cx="8862398" cy="489878"/>
       </dsp:txXfrm>
     </dsp:sp>
     <dsp:sp modelId="{A9FED693-A99D-4A6A-A0F0-13DB2854A162}">
@@ -4657,8 +4689,8 @@
       </dsp:nvSpPr>
       <dsp:spPr>
         <a:xfrm>
-          <a:off x="0" y="2539826"/>
-          <a:ext cx="8915400" cy="551655"/>
+          <a:off x="0" y="2556970"/>
+          <a:ext cx="8915400" cy="542880"/>
         </a:xfrm>
         <a:prstGeom prst="roundRect">
           <a:avLst/>
@@ -4699,12 +4731,12 @@
         </a:fontRef>
       </dsp:style>
       <dsp:txBody>
-        <a:bodyPr spcFirstLastPara="0" vert="horz" wrap="square" lIns="87630" tIns="87630" rIns="87630" bIns="87630" numCol="1" spcCol="1270" anchor="ctr" anchorCtr="0">
+        <a:bodyPr spcFirstLastPara="0" vert="horz" wrap="square" lIns="64770" tIns="64770" rIns="64770" bIns="64770" numCol="1" spcCol="1270" anchor="ctr" anchorCtr="0">
           <a:noAutofit/>
         </a:bodyPr>
         <a:lstStyle/>
         <a:p>
-          <a:pPr marL="0" lvl="0" indent="0" algn="l" defTabSz="1022350">
+          <a:pPr marL="0" lvl="0" indent="0" algn="l" defTabSz="755650">
             <a:lnSpc>
               <a:spcPct val="90000"/>
             </a:lnSpc>
@@ -4717,14 +4749,14 @@
             <a:buNone/>
           </a:pPr>
           <a:r>
-            <a:rPr lang="en-US" sz="2300" kern="1200" dirty="0"/>
-            <a:t>X4</a:t>
+            <a:rPr lang="en-US" sz="1700" kern="1200" dirty="0"/>
+            <a:t>Flattened into 1D and Ran Through Dense Layer</a:t>
           </a:r>
         </a:p>
       </dsp:txBody>
       <dsp:txXfrm>
-        <a:off x="26930" y="2566756"/>
-        <a:ext cx="8861540" cy="497795"/>
+        <a:off x="26501" y="2583471"/>
+        <a:ext cx="8862398" cy="489878"/>
       </dsp:txXfrm>
     </dsp:sp>
     <dsp:sp modelId="{02D43881-500F-4308-B993-48DDC6B63F90}">
@@ -4734,8 +4766,8 @@
       </dsp:nvSpPr>
       <dsp:spPr>
         <a:xfrm>
-          <a:off x="0" y="3157721"/>
-          <a:ext cx="8915400" cy="551655"/>
+          <a:off x="0" y="3183371"/>
+          <a:ext cx="8915400" cy="542880"/>
         </a:xfrm>
         <a:prstGeom prst="roundRect">
           <a:avLst/>
@@ -4776,12 +4808,12 @@
         </a:fontRef>
       </dsp:style>
       <dsp:txBody>
-        <a:bodyPr spcFirstLastPara="0" vert="horz" wrap="square" lIns="87630" tIns="87630" rIns="87630" bIns="87630" numCol="1" spcCol="1270" anchor="ctr" anchorCtr="0">
+        <a:bodyPr spcFirstLastPara="0" vert="horz" wrap="square" lIns="64770" tIns="64770" rIns="64770" bIns="64770" numCol="1" spcCol="1270" anchor="ctr" anchorCtr="0">
           <a:noAutofit/>
         </a:bodyPr>
         <a:lstStyle/>
         <a:p>
-          <a:pPr marL="0" lvl="0" indent="0" algn="l" defTabSz="1022350">
+          <a:pPr marL="0" lvl="0" indent="0" algn="l" defTabSz="755650">
             <a:lnSpc>
               <a:spcPct val="90000"/>
             </a:lnSpc>
@@ -4794,14 +4826,14 @@
             <a:buNone/>
           </a:pPr>
           <a:r>
-            <a:rPr lang="en-US" sz="2300" kern="1200" dirty="0"/>
-            <a:t>X5</a:t>
+            <a:rPr lang="en-US" sz="1700" kern="1200" dirty="0"/>
+            <a:t>Created Output with Bird Probabilities</a:t>
           </a:r>
         </a:p>
       </dsp:txBody>
       <dsp:txXfrm>
-        <a:off x="26930" y="3184651"/>
-        <a:ext cx="8861540" cy="497795"/>
+        <a:off x="26501" y="3209872"/>
+        <a:ext cx="8862398" cy="489878"/>
       </dsp:txXfrm>
     </dsp:sp>
   </dsp:spTree>
@@ -8698,7 +8730,7 @@
           <a:p>
             <a:fld id="{CCB3CE20-769C-48A4-A90E-395B11202C2B}" type="datetimeFigureOut">
               <a:rPr lang="en-US" smtClean="0"/>
-              <a:t>2/8/23</a:t>
+              <a:t>2/8/2023</a:t>
             </a:fld>
             <a:endParaRPr lang="en-US"/>
           </a:p>
@@ -9036,7 +9068,7 @@
           <a:p>
             <a:fld id="{CCB3CE20-769C-48A4-A90E-395B11202C2B}" type="datetimeFigureOut">
               <a:rPr lang="en-US" smtClean="0"/>
-              <a:t>2/8/23</a:t>
+              <a:t>2/8/2023</a:t>
             </a:fld>
             <a:endParaRPr lang="en-US"/>
           </a:p>
@@ -9437,7 +9469,7 @@
           <a:p>
             <a:fld id="{CCB3CE20-769C-48A4-A90E-395B11202C2B}" type="datetimeFigureOut">
               <a:rPr lang="en-US" smtClean="0"/>
-              <a:t>2/8/23</a:t>
+              <a:t>2/8/2023</a:t>
             </a:fld>
             <a:endParaRPr lang="en-US"/>
           </a:p>
@@ -9773,7 +9805,7 @@
           <a:p>
             <a:fld id="{CCB3CE20-769C-48A4-A90E-395B11202C2B}" type="datetimeFigureOut">
               <a:rPr lang="en-US" smtClean="0"/>
-              <a:t>2/8/23</a:t>
+              <a:t>2/8/2023</a:t>
             </a:fld>
             <a:endParaRPr lang="en-US"/>
           </a:p>
@@ -10093,7 +10125,7 @@
           <a:p>
             <a:fld id="{CCB3CE20-769C-48A4-A90E-395B11202C2B}" type="datetimeFigureOut">
               <a:rPr lang="en-US" smtClean="0"/>
-              <a:t>2/8/23</a:t>
+              <a:t>2/8/2023</a:t>
             </a:fld>
             <a:endParaRPr lang="en-US"/>
           </a:p>
@@ -10489,7 +10521,7 @@
           <a:p>
             <a:fld id="{CCB3CE20-769C-48A4-A90E-395B11202C2B}" type="datetimeFigureOut">
               <a:rPr lang="en-US" smtClean="0"/>
-              <a:t>2/8/23</a:t>
+              <a:t>2/8/2023</a:t>
             </a:fld>
             <a:endParaRPr lang="en-US"/>
           </a:p>
@@ -10746,7 +10778,7 @@
           <a:p>
             <a:fld id="{CCB3CE20-769C-48A4-A90E-395B11202C2B}" type="datetimeFigureOut">
               <a:rPr lang="en-US" smtClean="0"/>
-              <a:t>2/8/23</a:t>
+              <a:t>2/8/2023</a:t>
             </a:fld>
             <a:endParaRPr lang="en-US"/>
           </a:p>
@@ -11008,7 +11040,7 @@
           <a:p>
             <a:fld id="{CCB3CE20-769C-48A4-A90E-395B11202C2B}" type="datetimeFigureOut">
               <a:rPr lang="en-US" smtClean="0"/>
-              <a:t>2/8/23</a:t>
+              <a:t>2/8/2023</a:t>
             </a:fld>
             <a:endParaRPr lang="en-US"/>
           </a:p>
@@ -11270,7 +11302,7 @@
           <a:p>
             <a:fld id="{CCB3CE20-769C-48A4-A90E-395B11202C2B}" type="datetimeFigureOut">
               <a:rPr lang="en-US" smtClean="0"/>
-              <a:t>2/8/23</a:t>
+              <a:t>2/8/2023</a:t>
             </a:fld>
             <a:endParaRPr lang="en-US"/>
           </a:p>
@@ -11599,7 +11631,7 @@
           <a:p>
             <a:fld id="{CCB3CE20-769C-48A4-A90E-395B11202C2B}" type="datetimeFigureOut">
               <a:rPr lang="en-US" smtClean="0"/>
-              <a:t>2/8/23</a:t>
+              <a:t>2/8/2023</a:t>
             </a:fld>
             <a:endParaRPr lang="en-US"/>
           </a:p>
@@ -11922,7 +11954,7 @@
           <a:p>
             <a:fld id="{CCB3CE20-769C-48A4-A90E-395B11202C2B}" type="datetimeFigureOut">
               <a:rPr lang="en-US" smtClean="0"/>
-              <a:t>2/8/23</a:t>
+              <a:t>2/8/2023</a:t>
             </a:fld>
             <a:endParaRPr lang="en-US"/>
           </a:p>
@@ -12379,7 +12411,7 @@
           <a:p>
             <a:fld id="{CCB3CE20-769C-48A4-A90E-395B11202C2B}" type="datetimeFigureOut">
               <a:rPr lang="en-US" smtClean="0"/>
-              <a:t>2/8/23</a:t>
+              <a:t>2/8/2023</a:t>
             </a:fld>
             <a:endParaRPr lang="en-US"/>
           </a:p>
@@ -12584,7 +12616,7 @@
           <a:p>
             <a:fld id="{CCB3CE20-769C-48A4-A90E-395B11202C2B}" type="datetimeFigureOut">
               <a:rPr lang="en-US" smtClean="0"/>
-              <a:t>2/8/23</a:t>
+              <a:t>2/8/2023</a:t>
             </a:fld>
             <a:endParaRPr lang="en-US"/>
           </a:p>
@@ -12761,7 +12793,7 @@
           <a:p>
             <a:fld id="{CCB3CE20-769C-48A4-A90E-395B11202C2B}" type="datetimeFigureOut">
               <a:rPr lang="en-US" smtClean="0"/>
-              <a:t>2/8/23</a:t>
+              <a:t>2/8/2023</a:t>
             </a:fld>
             <a:endParaRPr lang="en-US"/>
           </a:p>
@@ -13094,7 +13126,7 @@
           <a:p>
             <a:fld id="{CCB3CE20-769C-48A4-A90E-395B11202C2B}" type="datetimeFigureOut">
               <a:rPr lang="en-US" smtClean="0"/>
-              <a:t>2/8/23</a:t>
+              <a:t>2/8/2023</a:t>
             </a:fld>
             <a:endParaRPr lang="en-US"/>
           </a:p>
@@ -13439,7 +13471,7 @@
           <a:p>
             <a:fld id="{CCB3CE20-769C-48A4-A90E-395B11202C2B}" type="datetimeFigureOut">
               <a:rPr lang="en-US" smtClean="0"/>
-              <a:t>2/8/23</a:t>
+              <a:t>2/8/2023</a:t>
             </a:fld>
             <a:endParaRPr lang="en-US"/>
           </a:p>
@@ -15556,7 +15588,7 @@
           <a:p>
             <a:fld id="{CCB3CE20-769C-48A4-A90E-395B11202C2B}" type="datetimeFigureOut">
               <a:rPr lang="en-US" smtClean="0"/>
-              <a:t>2/8/23</a:t>
+              <a:t>2/8/2023</a:t>
             </a:fld>
             <a:endParaRPr lang="en-US"/>
           </a:p>
@@ -20457,6 +20489,11 @@
           </p:cNvGraphicFramePr>
           <p:nvPr>
             <p:ph idx="1"/>
+            <p:extLst>
+              <p:ext uri="{D42A27DB-BD31-4B8C-83A1-F6EECF244321}">
+                <p14:modId xmlns:p14="http://schemas.microsoft.com/office/powerpoint/2010/main" val="2714442217"/>
+              </p:ext>
+            </p:extLst>
           </p:nvPr>
         </p:nvGraphicFramePr>
         <p:xfrm>
@@ -20654,7 +20691,7 @@
             <p:ph idx="1"/>
             <p:extLst>
               <p:ext uri="{D42A27DB-BD31-4B8C-83A1-F6EECF244321}">
-                <p14:modId xmlns:p14="http://schemas.microsoft.com/office/powerpoint/2010/main" val="3387845188"/>
+                <p14:modId xmlns:p14="http://schemas.microsoft.com/office/powerpoint/2010/main" val="2550353423"/>
               </p:ext>
             </p:extLst>
           </p:nvPr>
@@ -20748,7 +20785,21 @@
           <a:bodyPr/>
           <a:lstStyle/>
           <a:p>
+            <a:r>
+              <a:rPr lang="en-US" dirty="0"/>
+              <a:t>Google </a:t>
+            </a:r>
+            <a:r>
+              <a:rPr lang="en-US" dirty="0" err="1"/>
+              <a:t>Colab</a:t>
+            </a:r>
             <a:endParaRPr lang="en-US" dirty="0"/>
+          </a:p>
+          <a:p>
+            <a:r>
+              <a:rPr lang="en-US" dirty="0"/>
+              <a:t>Google Drive</a:t>
+            </a:r>
           </a:p>
         </p:txBody>
       </p:sp>

</xml_diff>

<commit_message>
Revet "Add teammate photo"
This reverts commit 33adf784c1f79ec31fde2032ed32d4d83550df35.
"Updating revert"
</commit_message>
<xml_diff>
--- a/Presentation.pptx
+++ b/Presentation.pptx
@@ -9,10 +9,8 @@
     <p:sldId id="258" r:id="rId3"/>
     <p:sldId id="263" r:id="rId4"/>
     <p:sldId id="264" r:id="rId5"/>
-    <p:sldId id="267" r:id="rId6"/>
+    <p:sldId id="260" r:id="rId6"/>
     <p:sldId id="261" r:id="rId7"/>
-    <p:sldId id="266" r:id="rId8"/>
-    <p:sldId id="265" r:id="rId9"/>
   </p:sldIdLst>
   <p:sldSz cx="12192000" cy="6858000"/>
   <p:notesSz cx="6858000" cy="9144000"/>
@@ -8716,7 +8714,7 @@
           <a:p>
             <a:fld id="{CCB3CE20-769C-48A4-A90E-395B11202C2B}" type="datetimeFigureOut">
               <a:rPr lang="en-US" smtClean="0"/>
-              <a:t>2/16/2023</a:t>
+              <a:t>2/8/2023</a:t>
             </a:fld>
             <a:endParaRPr lang="en-US"/>
           </a:p>
@@ -9054,7 +9052,7 @@
           <a:p>
             <a:fld id="{CCB3CE20-769C-48A4-A90E-395B11202C2B}" type="datetimeFigureOut">
               <a:rPr lang="en-US" smtClean="0"/>
-              <a:t>2/16/2023</a:t>
+              <a:t>2/8/2023</a:t>
             </a:fld>
             <a:endParaRPr lang="en-US"/>
           </a:p>
@@ -9455,7 +9453,7 @@
           <a:p>
             <a:fld id="{CCB3CE20-769C-48A4-A90E-395B11202C2B}" type="datetimeFigureOut">
               <a:rPr lang="en-US" smtClean="0"/>
-              <a:t>2/16/2023</a:t>
+              <a:t>2/8/2023</a:t>
             </a:fld>
             <a:endParaRPr lang="en-US"/>
           </a:p>
@@ -9791,7 +9789,7 @@
           <a:p>
             <a:fld id="{CCB3CE20-769C-48A4-A90E-395B11202C2B}" type="datetimeFigureOut">
               <a:rPr lang="en-US" smtClean="0"/>
-              <a:t>2/16/2023</a:t>
+              <a:t>2/8/2023</a:t>
             </a:fld>
             <a:endParaRPr lang="en-US"/>
           </a:p>
@@ -10111,7 +10109,7 @@
           <a:p>
             <a:fld id="{CCB3CE20-769C-48A4-A90E-395B11202C2B}" type="datetimeFigureOut">
               <a:rPr lang="en-US" smtClean="0"/>
-              <a:t>2/16/2023</a:t>
+              <a:t>2/8/2023</a:t>
             </a:fld>
             <a:endParaRPr lang="en-US"/>
           </a:p>
@@ -10507,7 +10505,7 @@
           <a:p>
             <a:fld id="{CCB3CE20-769C-48A4-A90E-395B11202C2B}" type="datetimeFigureOut">
               <a:rPr lang="en-US" smtClean="0"/>
-              <a:t>2/16/2023</a:t>
+              <a:t>2/8/2023</a:t>
             </a:fld>
             <a:endParaRPr lang="en-US"/>
           </a:p>
@@ -10764,7 +10762,7 @@
           <a:p>
             <a:fld id="{CCB3CE20-769C-48A4-A90E-395B11202C2B}" type="datetimeFigureOut">
               <a:rPr lang="en-US" smtClean="0"/>
-              <a:t>2/16/2023</a:t>
+              <a:t>2/8/2023</a:t>
             </a:fld>
             <a:endParaRPr lang="en-US"/>
           </a:p>
@@ -11026,7 +11024,7 @@
           <a:p>
             <a:fld id="{CCB3CE20-769C-48A4-A90E-395B11202C2B}" type="datetimeFigureOut">
               <a:rPr lang="en-US" smtClean="0"/>
-              <a:t>2/16/2023</a:t>
+              <a:t>2/8/2023</a:t>
             </a:fld>
             <a:endParaRPr lang="en-US"/>
           </a:p>
@@ -11288,7 +11286,7 @@
           <a:p>
             <a:fld id="{CCB3CE20-769C-48A4-A90E-395B11202C2B}" type="datetimeFigureOut">
               <a:rPr lang="en-US" smtClean="0"/>
-              <a:t>2/16/2023</a:t>
+              <a:t>2/8/2023</a:t>
             </a:fld>
             <a:endParaRPr lang="en-US"/>
           </a:p>
@@ -11617,7 +11615,7 @@
           <a:p>
             <a:fld id="{CCB3CE20-769C-48A4-A90E-395B11202C2B}" type="datetimeFigureOut">
               <a:rPr lang="en-US" smtClean="0"/>
-              <a:t>2/16/2023</a:t>
+              <a:t>2/8/2023</a:t>
             </a:fld>
             <a:endParaRPr lang="en-US"/>
           </a:p>
@@ -11940,7 +11938,7 @@
           <a:p>
             <a:fld id="{CCB3CE20-769C-48A4-A90E-395B11202C2B}" type="datetimeFigureOut">
               <a:rPr lang="en-US" smtClean="0"/>
-              <a:t>2/16/2023</a:t>
+              <a:t>2/8/2023</a:t>
             </a:fld>
             <a:endParaRPr lang="en-US"/>
           </a:p>
@@ -12397,7 +12395,7 @@
           <a:p>
             <a:fld id="{CCB3CE20-769C-48A4-A90E-395B11202C2B}" type="datetimeFigureOut">
               <a:rPr lang="en-US" smtClean="0"/>
-              <a:t>2/16/2023</a:t>
+              <a:t>2/8/2023</a:t>
             </a:fld>
             <a:endParaRPr lang="en-US"/>
           </a:p>
@@ -12602,7 +12600,7 @@
           <a:p>
             <a:fld id="{CCB3CE20-769C-48A4-A90E-395B11202C2B}" type="datetimeFigureOut">
               <a:rPr lang="en-US" smtClean="0"/>
-              <a:t>2/16/2023</a:t>
+              <a:t>2/8/2023</a:t>
             </a:fld>
             <a:endParaRPr lang="en-US"/>
           </a:p>
@@ -12779,7 +12777,7 @@
           <a:p>
             <a:fld id="{CCB3CE20-769C-48A4-A90E-395B11202C2B}" type="datetimeFigureOut">
               <a:rPr lang="en-US" smtClean="0"/>
-              <a:t>2/16/2023</a:t>
+              <a:t>2/8/2023</a:t>
             </a:fld>
             <a:endParaRPr lang="en-US"/>
           </a:p>
@@ -13112,7 +13110,7 @@
           <a:p>
             <a:fld id="{CCB3CE20-769C-48A4-A90E-395B11202C2B}" type="datetimeFigureOut">
               <a:rPr lang="en-US" smtClean="0"/>
-              <a:t>2/16/2023</a:t>
+              <a:t>2/8/2023</a:t>
             </a:fld>
             <a:endParaRPr lang="en-US"/>
           </a:p>
@@ -13457,7 +13455,7 @@
           <a:p>
             <a:fld id="{CCB3CE20-769C-48A4-A90E-395B11202C2B}" type="datetimeFigureOut">
               <a:rPr lang="en-US" smtClean="0"/>
-              <a:t>2/16/2023</a:t>
+              <a:t>2/8/2023</a:t>
             </a:fld>
             <a:endParaRPr lang="en-US"/>
           </a:p>
@@ -15574,7 +15572,7 @@
           <a:p>
             <a:fld id="{CCB3CE20-769C-48A4-A90E-395B11202C2B}" type="datetimeFigureOut">
               <a:rPr lang="en-US" smtClean="0"/>
-              <a:t>2/16/2023</a:t>
+              <a:t>2/8/2023</a:t>
             </a:fld>
             <a:endParaRPr lang="en-US"/>
           </a:p>
@@ -20477,13 +20475,13 @@
             <p:ph idx="1"/>
             <p:extLst>
               <p:ext uri="{D42A27DB-BD31-4B8C-83A1-F6EECF244321}">
-                <p14:modId xmlns:p14="http://schemas.microsoft.com/office/powerpoint/2010/main" val="1423650579"/>
+                <p14:modId xmlns:p14="http://schemas.microsoft.com/office/powerpoint/2010/main" val="2714442217"/>
               </p:ext>
             </p:extLst>
           </p:nvPr>
         </p:nvGraphicFramePr>
         <p:xfrm>
-          <a:off x="2863532" y="1757997"/>
+          <a:off x="2863532" y="2596896"/>
           <a:ext cx="8915400" cy="3777622"/>
         </p:xfrm>
         <a:graphic>
@@ -20727,7 +20725,7 @@
           <p:cNvPr id="2" name="Title 1">
             <a:extLst>
               <a:ext uri="{FF2B5EF4-FFF2-40B4-BE49-F238E27FC236}">
-                <a16:creationId xmlns:a16="http://schemas.microsoft.com/office/drawing/2014/main" id="{FEA52EE9-C4E7-2D7E-DF07-D7D10D5D7AE1}"/>
+                <a16:creationId xmlns:a16="http://schemas.microsoft.com/office/drawing/2014/main" id="{8BAD1732-EC8E-23CA-0BF6-03CF6A0E3EB5}"/>
               </a:ext>
             </a:extLst>
           </p:cNvPr>
@@ -20745,44 +20743,54 @@
           <a:p>
             <a:r>
               <a:rPr lang="en-US" dirty="0"/>
-              <a:t>Model Accuracy</a:t>
+              <a:t>Tools</a:t>
             </a:r>
           </a:p>
         </p:txBody>
       </p:sp>
-      <p:pic>
-        <p:nvPicPr>
-          <p:cNvPr id="5" name="Content Placeholder 4">
+      <p:sp>
+        <p:nvSpPr>
+          <p:cNvPr id="3" name="Content Placeholder 2">
             <a:extLst>
               <a:ext uri="{FF2B5EF4-FFF2-40B4-BE49-F238E27FC236}">
-                <a16:creationId xmlns:a16="http://schemas.microsoft.com/office/drawing/2014/main" id="{53215EEF-0255-7916-9425-3A496873D95A}"/>
+                <a16:creationId xmlns:a16="http://schemas.microsoft.com/office/drawing/2014/main" id="{901C66AA-10BD-56D5-29E9-2C93EFD90908}"/>
               </a:ext>
             </a:extLst>
           </p:cNvPr>
-          <p:cNvPicPr>
-            <a:picLocks noGrp="1" noChangeAspect="1"/>
-          </p:cNvPicPr>
+          <p:cNvSpPr>
+            <a:spLocks noGrp="1"/>
+          </p:cNvSpPr>
           <p:nvPr>
             <p:ph idx="1"/>
           </p:nvPr>
-        </p:nvPicPr>
-        <p:blipFill>
-          <a:blip r:embed="rId2"/>
-          <a:stretch>
-            <a:fillRect/>
-          </a:stretch>
-        </p:blipFill>
-        <p:spPr>
-          <a:xfrm>
-            <a:off x="2731738" y="2186934"/>
-            <a:ext cx="7727878" cy="4345388"/>
-          </a:xfrm>
-        </p:spPr>
-      </p:pic>
+        </p:nvSpPr>
+        <p:spPr/>
+        <p:txBody>
+          <a:bodyPr/>
+          <a:lstStyle/>
+          <a:p>
+            <a:r>
+              <a:rPr lang="en-US" dirty="0"/>
+              <a:t>Google </a:t>
+            </a:r>
+            <a:r>
+              <a:rPr lang="en-US" dirty="0" err="1"/>
+              <a:t>Colab</a:t>
+            </a:r>
+            <a:endParaRPr lang="en-US" dirty="0"/>
+          </a:p>
+          <a:p>
+            <a:r>
+              <a:rPr lang="en-US" dirty="0"/>
+              <a:t>Google Drive</a:t>
+            </a:r>
+          </a:p>
+        </p:txBody>
+      </p:sp>
     </p:spTree>
     <p:extLst>
       <p:ext uri="{BB962C8B-B14F-4D97-AF65-F5344CB8AC3E}">
-        <p14:creationId xmlns:p14="http://schemas.microsoft.com/office/powerpoint/2010/main" val="4125028116"/>
+        <p14:creationId xmlns:p14="http://schemas.microsoft.com/office/powerpoint/2010/main" val="1355901103"/>
       </p:ext>
     </p:extLst>
   </p:cSld>
@@ -20832,65 +20840,7 @@
           <a:p>
             <a:r>
               <a:rPr lang="en-US" dirty="0"/>
-              <a:t>Website Demo </a:t>
-            </a:r>
-          </a:p>
-        </p:txBody>
-      </p:sp>
-    </p:spTree>
-    <p:extLst>
-      <p:ext uri="{BB962C8B-B14F-4D97-AF65-F5344CB8AC3E}">
-        <p14:creationId xmlns:p14="http://schemas.microsoft.com/office/powerpoint/2010/main" val="3593577087"/>
-      </p:ext>
-    </p:extLst>
-  </p:cSld>
-  <p:clrMapOvr>
-    <a:masterClrMapping/>
-  </p:clrMapOvr>
-</p:sld>
-</file>
-
-<file path=ppt/slides/slide7.xml><?xml version="1.0" encoding="utf-8"?>
-<p:sld xmlns:a="http://schemas.openxmlformats.org/drawingml/2006/main" xmlns:r="http://schemas.openxmlformats.org/officeDocument/2006/relationships" xmlns:p="http://schemas.openxmlformats.org/presentationml/2006/main">
-  <p:cSld>
-    <p:spTree>
-      <p:nvGrpSpPr>
-        <p:cNvPr id="1" name=""/>
-        <p:cNvGrpSpPr/>
-        <p:nvPr/>
-      </p:nvGrpSpPr>
-      <p:grpSpPr>
-        <a:xfrm>
-          <a:off x="0" y="0"/>
-          <a:ext cx="0" cy="0"/>
-          <a:chOff x="0" y="0"/>
-          <a:chExt cx="0" cy="0"/>
-        </a:xfrm>
-      </p:grpSpPr>
-      <p:sp>
-        <p:nvSpPr>
-          <p:cNvPr id="2" name="Title 1">
-            <a:extLst>
-              <a:ext uri="{FF2B5EF4-FFF2-40B4-BE49-F238E27FC236}">
-                <a16:creationId xmlns:a16="http://schemas.microsoft.com/office/drawing/2014/main" id="{E08C84F6-255B-D242-CA1D-C865252D0FD4}"/>
-              </a:ext>
-            </a:extLst>
-          </p:cNvPr>
-          <p:cNvSpPr>
-            <a:spLocks noGrp="1"/>
-          </p:cNvSpPr>
-          <p:nvPr>
-            <p:ph type="title"/>
-          </p:nvPr>
-        </p:nvSpPr>
-        <p:spPr/>
-        <p:txBody>
-          <a:bodyPr/>
-          <a:lstStyle/>
-          <a:p>
-            <a:r>
-              <a:rPr lang="en-US" dirty="0"/>
-              <a:t>Way Forward / Next Steps </a:t>
+              <a:t>Website &amp; Visualization</a:t>
             </a:r>
           </a:p>
         </p:txBody>
@@ -20900,7 +20850,7 @@
           <p:cNvPr id="3" name="Content Placeholder 2">
             <a:extLst>
               <a:ext uri="{FF2B5EF4-FFF2-40B4-BE49-F238E27FC236}">
-                <a16:creationId xmlns:a16="http://schemas.microsoft.com/office/drawing/2014/main" id="{15A6A58C-EDD2-19E2-73C2-1C19A6AE6DB6}"/>
+                <a16:creationId xmlns:a16="http://schemas.microsoft.com/office/drawing/2014/main" id="{3E421180-2EB8-702C-286D-9EAC66DA0D73}"/>
               </a:ext>
             </a:extLst>
           </p:cNvPr>
@@ -20916,165 +20866,29 @@
           <a:bodyPr/>
           <a:lstStyle/>
           <a:p>
-            <a:endParaRPr lang="en-US"/>
+            <a:r>
+              <a:rPr lang="en-US" dirty="0"/>
+              <a:t>Houstonians will be able to use our interactive website to upload pictures of birds they have taken around the City of Houston. Our machine will be able to identify the bird they have uploaded to our website, by returning them with the bird’s name along with a short bio about the bird. </a:t>
+            </a:r>
+          </a:p>
+          <a:p>
+            <a:pPr marL="0" indent="0">
+              <a:buNone/>
+            </a:pPr>
+            <a:endParaRPr lang="en-US" dirty="0"/>
+          </a:p>
+          <a:p>
+            <a:r>
+              <a:rPr lang="en-US" dirty="0"/>
+              <a:t>We will be using HTML, JavaScript, VSC and Flask on building our interactive website. </a:t>
+            </a:r>
           </a:p>
         </p:txBody>
       </p:sp>
     </p:spTree>
     <p:extLst>
       <p:ext uri="{BB962C8B-B14F-4D97-AF65-F5344CB8AC3E}">
-        <p14:creationId xmlns:p14="http://schemas.microsoft.com/office/powerpoint/2010/main" val="119490441"/>
-      </p:ext>
-    </p:extLst>
-  </p:cSld>
-  <p:clrMapOvr>
-    <a:masterClrMapping/>
-  </p:clrMapOvr>
-</p:sld>
-</file>
-
-<file path=ppt/slides/slide8.xml><?xml version="1.0" encoding="utf-8"?>
-<p:sld xmlns:a="http://schemas.openxmlformats.org/drawingml/2006/main" xmlns:r="http://schemas.openxmlformats.org/officeDocument/2006/relationships" xmlns:p="http://schemas.openxmlformats.org/presentationml/2006/main">
-  <p:cSld>
-    <p:spTree>
-      <p:nvGrpSpPr>
-        <p:cNvPr id="1" name=""/>
-        <p:cNvGrpSpPr/>
-        <p:nvPr/>
-      </p:nvGrpSpPr>
-      <p:grpSpPr>
-        <a:xfrm>
-          <a:off x="0" y="0"/>
-          <a:ext cx="0" cy="0"/>
-          <a:chOff x="0" y="0"/>
-          <a:chExt cx="0" cy="0"/>
-        </a:xfrm>
-      </p:grpSpPr>
-      <p:sp>
-        <p:nvSpPr>
-          <p:cNvPr id="7" name="AutoShape 2">
-            <a:extLst>
-              <a:ext uri="{FF2B5EF4-FFF2-40B4-BE49-F238E27FC236}">
-                <a16:creationId xmlns:a16="http://schemas.microsoft.com/office/drawing/2014/main" id="{90A13A62-B4AC-103C-3082-9DD64AA45B75}"/>
-              </a:ext>
-            </a:extLst>
-          </p:cNvPr>
-          <p:cNvSpPr>
-            <a:spLocks noChangeAspect="1" noChangeArrowheads="1"/>
-          </p:cNvSpPr>
-          <p:nvPr/>
-        </p:nvSpPr>
-        <p:spPr bwMode="auto">
-          <a:xfrm>
-            <a:off x="5943600" y="3276600"/>
-            <a:ext cx="304800" cy="304800"/>
-          </a:xfrm>
-          <a:prstGeom prst="rect">
-            <a:avLst/>
-          </a:prstGeom>
-          <a:noFill/>
-          <a:extLst>
-            <a:ext uri="{909E8E84-426E-40DD-AFC4-6F175D3DCCD1}">
-              <a14:hiddenFill xmlns:a14="http://schemas.microsoft.com/office/drawing/2010/main">
-                <a:solidFill>
-                  <a:srgbClr val="FFFFFF"/>
-                </a:solidFill>
-              </a14:hiddenFill>
-            </a:ext>
-          </a:extLst>
-        </p:spPr>
-        <p:txBody>
-          <a:bodyPr vert="horz" wrap="square" lIns="91440" tIns="45720" rIns="91440" bIns="45720" numCol="1" anchor="t" anchorCtr="0" compatLnSpc="1">
-            <a:prstTxWarp prst="textNoShape">
-              <a:avLst/>
-            </a:prstTxWarp>
-          </a:bodyPr>
-          <a:lstStyle/>
-          <a:p>
-            <a:endParaRPr lang="en-US"/>
-          </a:p>
-        </p:txBody>
-      </p:sp>
-      <p:sp>
-        <p:nvSpPr>
-          <p:cNvPr id="8" name="AutoShape 4">
-            <a:extLst>
-              <a:ext uri="{FF2B5EF4-FFF2-40B4-BE49-F238E27FC236}">
-                <a16:creationId xmlns:a16="http://schemas.microsoft.com/office/drawing/2014/main" id="{40CFA4D3-2753-6876-20A7-6AB6D83BB048}"/>
-              </a:ext>
-            </a:extLst>
-          </p:cNvPr>
-          <p:cNvSpPr>
-            <a:spLocks noGrp="1" noChangeAspect="1" noChangeArrowheads="1"/>
-          </p:cNvSpPr>
-          <p:nvPr>
-            <p:ph type="title"/>
-          </p:nvPr>
-        </p:nvSpPr>
-        <p:spPr bwMode="auto">
-          <a:prstGeom prst="rect">
-            <a:avLst/>
-          </a:prstGeom>
-          <a:noFill/>
-          <a:extLst>
-            <a:ext uri="{909E8E84-426E-40DD-AFC4-6F175D3DCCD1}">
-              <a14:hiddenFill xmlns:a14="http://schemas.microsoft.com/office/drawing/2010/main">
-                <a:solidFill>
-                  <a:srgbClr val="FFFFFF"/>
-                </a:solidFill>
-              </a14:hiddenFill>
-            </a:ext>
-          </a:extLst>
-        </p:spPr>
-        <p:txBody>
-          <a:bodyPr vert="horz" wrap="square" lIns="91440" tIns="45720" rIns="91440" bIns="45720" numCol="1" anchor="t" anchorCtr="0" compatLnSpc="1">
-            <a:prstTxWarp prst="textNoShape">
-              <a:avLst/>
-            </a:prstTxWarp>
-          </a:bodyPr>
-          <a:lstStyle/>
-          <a:p>
-            <a:r>
-              <a:rPr lang="en-US" dirty="0"/>
-              <a:t>Questions? </a:t>
-            </a:r>
-          </a:p>
-        </p:txBody>
-      </p:sp>
-      <p:pic>
-        <p:nvPicPr>
-          <p:cNvPr id="10" name="Picture 9">
-            <a:extLst>
-              <a:ext uri="{FF2B5EF4-FFF2-40B4-BE49-F238E27FC236}">
-                <a16:creationId xmlns:a16="http://schemas.microsoft.com/office/drawing/2014/main" id="{A35DE2E5-559E-3E51-704C-6AE9FA2B0740}"/>
-              </a:ext>
-            </a:extLst>
-          </p:cNvPr>
-          <p:cNvPicPr>
-            <a:picLocks noChangeAspect="1"/>
-          </p:cNvPicPr>
-          <p:nvPr/>
-        </p:nvPicPr>
-        <p:blipFill>
-          <a:blip r:embed="rId2"/>
-          <a:stretch>
-            <a:fillRect/>
-          </a:stretch>
-        </p:blipFill>
-        <p:spPr>
-          <a:xfrm>
-            <a:off x="5662042" y="984387"/>
-            <a:ext cx="3218576" cy="5436621"/>
-          </a:xfrm>
-          <a:prstGeom prst="rect">
-            <a:avLst/>
-          </a:prstGeom>
-        </p:spPr>
-      </p:pic>
-    </p:spTree>
-    <p:extLst>
-      <p:ext uri="{BB962C8B-B14F-4D97-AF65-F5344CB8AC3E}">
-        <p14:creationId xmlns:p14="http://schemas.microsoft.com/office/powerpoint/2010/main" val="2878224073"/>
+        <p14:creationId xmlns:p14="http://schemas.microsoft.com/office/powerpoint/2010/main" val="3593577087"/>
       </p:ext>
     </p:extLst>
   </p:cSld>

</xml_diff>